<commit_message>
yanked powerpoint from the void. here it is.
</commit_message>
<xml_diff>
--- a/Presentation.pptx
+++ b/Presentation.pptx
@@ -9,6 +9,12 @@
     <p:sldId id="260" r:id="rId3"/>
     <p:sldId id="257" r:id="rId4"/>
     <p:sldId id="258" r:id="rId5"/>
+    <p:sldId id="263" r:id="rId6"/>
+    <p:sldId id="262" r:id="rId7"/>
+    <p:sldId id="264" r:id="rId8"/>
+    <p:sldId id="265" r:id="rId9"/>
+    <p:sldId id="266" r:id="rId10"/>
+    <p:sldId id="261" r:id="rId11"/>
   </p:sldIdLst>
   <p:sldSz cx="9144000" cy="6858000" type="screen4x3"/>
   <p:notesSz cx="6858000" cy="9144000"/>
@@ -562,7 +568,7 @@
           <a:p>
             <a:fld id="{7D290233-0DD1-4A80-BB1E-9ADC3556DBB6}" type="datetimeFigureOut">
               <a:rPr lang="en-US" smtClean="0"/>
-              <a:t>5/7/2020</a:t>
+              <a:t>5/8/2020</a:t>
             </a:fld>
             <a:endParaRPr lang="en-US"/>
           </a:p>
@@ -1173,7 +1179,7 @@
           <a:p>
             <a:fld id="{7D290233-0DD1-4A80-BB1E-9ADC3556DBB6}" type="datetimeFigureOut">
               <a:rPr lang="en-US" smtClean="0"/>
-              <a:t>5/7/2020</a:t>
+              <a:t>5/8/2020</a:t>
             </a:fld>
             <a:endParaRPr lang="en-US"/>
           </a:p>
@@ -1745,7 +1751,7 @@
           <a:p>
             <a:fld id="{7D290233-0DD1-4A80-BB1E-9ADC3556DBB6}" type="datetimeFigureOut">
               <a:rPr lang="en-US" smtClean="0"/>
-              <a:t>5/7/2020</a:t>
+              <a:t>5/8/2020</a:t>
             </a:fld>
             <a:endParaRPr lang="en-US"/>
           </a:p>
@@ -2279,7 +2285,7 @@
           <a:p>
             <a:fld id="{7D290233-0DD1-4A80-BB1E-9ADC3556DBB6}" type="datetimeFigureOut">
               <a:rPr lang="en-US" smtClean="0"/>
-              <a:t>5/7/2020</a:t>
+              <a:t>5/8/2020</a:t>
             </a:fld>
             <a:endParaRPr lang="en-US"/>
           </a:p>
@@ -2681,7 +2687,7 @@
           <a:p>
             <a:fld id="{7D290233-0DD1-4A80-BB1E-9ADC3556DBB6}" type="datetimeFigureOut">
               <a:rPr lang="en-US" smtClean="0"/>
-              <a:t>5/7/2020</a:t>
+              <a:t>5/8/2020</a:t>
             </a:fld>
             <a:endParaRPr lang="en-US"/>
           </a:p>
@@ -3114,7 +3120,7 @@
           <a:p>
             <a:fld id="{7D290233-0DD1-4A80-BB1E-9ADC3556DBB6}" type="datetimeFigureOut">
               <a:rPr lang="en-US" smtClean="0"/>
-              <a:t>5/7/2020</a:t>
+              <a:t>5/8/2020</a:t>
             </a:fld>
             <a:endParaRPr lang="en-US"/>
           </a:p>
@@ -3516,7 +3522,7 @@
           <a:p>
             <a:fld id="{7D290233-0DD1-4A80-BB1E-9ADC3556DBB6}" type="datetimeFigureOut">
               <a:rPr lang="en-US" smtClean="0"/>
-              <a:t>5/7/2020</a:t>
+              <a:t>5/8/2020</a:t>
             </a:fld>
             <a:endParaRPr lang="en-US"/>
           </a:p>
@@ -3990,7 +3996,7 @@
           <a:p>
             <a:fld id="{7D290233-0DD1-4A80-BB1E-9ADC3556DBB6}" type="datetimeFigureOut">
               <a:rPr lang="en-US" smtClean="0"/>
-              <a:t>5/7/2020</a:t>
+              <a:t>5/8/2020</a:t>
             </a:fld>
             <a:endParaRPr lang="en-US"/>
           </a:p>
@@ -4440,7 +4446,7 @@
           <a:p>
             <a:fld id="{7D290233-0DD1-4A80-BB1E-9ADC3556DBB6}" type="datetimeFigureOut">
               <a:rPr lang="en-US" smtClean="0"/>
-              <a:t>5/7/2020</a:t>
+              <a:t>5/8/2020</a:t>
             </a:fld>
             <a:endParaRPr lang="en-US"/>
           </a:p>
@@ -4960,7 +4966,7 @@
           <a:p>
             <a:fld id="{7D290233-0DD1-4A80-BB1E-9ADC3556DBB6}" type="datetimeFigureOut">
               <a:rPr lang="en-US" smtClean="0"/>
-              <a:t>5/7/2020</a:t>
+              <a:t>5/8/2020</a:t>
             </a:fld>
             <a:endParaRPr lang="en-US"/>
           </a:p>
@@ -5680,7 +5686,7 @@
           <a:p>
             <a:fld id="{7D290233-0DD1-4A80-BB1E-9ADC3556DBB6}" type="datetimeFigureOut">
               <a:rPr lang="en-US" smtClean="0"/>
-              <a:t>5/7/2020</a:t>
+              <a:t>5/8/2020</a:t>
             </a:fld>
             <a:endParaRPr lang="en-US"/>
           </a:p>
@@ -6026,7 +6032,7 @@
           <a:p>
             <a:fld id="{7D290233-0DD1-4A80-BB1E-9ADC3556DBB6}" type="datetimeFigureOut">
               <a:rPr lang="en-US" smtClean="0"/>
-              <a:t>5/7/2020</a:t>
+              <a:t>5/8/2020</a:t>
             </a:fld>
             <a:endParaRPr lang="en-US"/>
           </a:p>
@@ -6295,7 +6301,7 @@
           <a:p>
             <a:fld id="{7D290233-0DD1-4A80-BB1E-9ADC3556DBB6}" type="datetimeFigureOut">
               <a:rPr lang="en-US" smtClean="0"/>
-              <a:t>5/7/2020</a:t>
+              <a:t>5/8/2020</a:t>
             </a:fld>
             <a:endParaRPr lang="en-US"/>
           </a:p>
@@ -6852,7 +6858,7 @@
           <a:p>
             <a:fld id="{7D290233-0DD1-4A80-BB1E-9ADC3556DBB6}" type="datetimeFigureOut">
               <a:rPr lang="en-US" smtClean="0"/>
-              <a:t>5/7/2020</a:t>
+              <a:t>5/8/2020</a:t>
             </a:fld>
             <a:endParaRPr lang="en-US"/>
           </a:p>
@@ -7062,7 +7068,7 @@
           <a:p>
             <a:fld id="{7D290233-0DD1-4A80-BB1E-9ADC3556DBB6}" type="datetimeFigureOut">
               <a:rPr lang="en-US" smtClean="0"/>
-              <a:t>5/7/2020</a:t>
+              <a:t>5/8/2020</a:t>
             </a:fld>
             <a:endParaRPr lang="en-US"/>
           </a:p>
@@ -7605,6 +7611,117 @@
 </p:sld>
 </file>
 
+<file path=ppt/slides/slide10.xml><?xml version="1.0" encoding="utf-8"?>
+<p:sld xmlns:a="http://schemas.openxmlformats.org/drawingml/2006/main" xmlns:r="http://schemas.openxmlformats.org/officeDocument/2006/relationships" xmlns:p="http://schemas.openxmlformats.org/presentationml/2006/main">
+  <p:cSld>
+    <p:spTree>
+      <p:nvGrpSpPr>
+        <p:cNvPr id="1" name=""/>
+        <p:cNvGrpSpPr/>
+        <p:nvPr/>
+      </p:nvGrpSpPr>
+      <p:grpSpPr>
+        <a:xfrm>
+          <a:off x="0" y="0"/>
+          <a:ext cx="0" cy="0"/>
+          <a:chOff x="0" y="0"/>
+          <a:chExt cx="0" cy="0"/>
+        </a:xfrm>
+      </p:grpSpPr>
+      <p:sp>
+        <p:nvSpPr>
+          <p:cNvPr id="2" name="Title 1"/>
+          <p:cNvSpPr>
+            <a:spLocks noGrp="1"/>
+          </p:cNvSpPr>
+          <p:nvPr>
+            <p:ph type="title"/>
+          </p:nvPr>
+        </p:nvSpPr>
+        <p:spPr/>
+        <p:txBody>
+          <a:bodyPr>
+            <a:normAutofit/>
+          </a:bodyPr>
+          <a:lstStyle/>
+          <a:p>
+            <a:r>
+              <a:rPr lang="en-US" dirty="0"/>
+              <a:t>Application Demo</a:t>
+            </a:r>
+            <a:br>
+              <a:rPr lang="en-US" dirty="0"/>
+            </a:br>
+            <a:r>
+              <a:rPr lang="en-US" sz="2000" dirty="0"/>
+              <a:t>There should </a:t>
+            </a:r>
+            <a:r>
+              <a:rPr lang="en-US" sz="2000"/>
+              <a:t>be a Part </a:t>
+            </a:r>
+            <a:r>
+              <a:rPr lang="en-US" sz="2000" dirty="0"/>
+              <a:t>for each person in the group</a:t>
+            </a:r>
+          </a:p>
+        </p:txBody>
+      </p:sp>
+      <p:sp>
+        <p:nvSpPr>
+          <p:cNvPr id="7" name="Content Placeholder 6"/>
+          <p:cNvSpPr>
+            <a:spLocks noGrp="1"/>
+          </p:cNvSpPr>
+          <p:nvPr>
+            <p:ph idx="1"/>
+          </p:nvPr>
+        </p:nvSpPr>
+        <p:spPr/>
+        <p:txBody>
+          <a:bodyPr>
+            <a:normAutofit/>
+          </a:bodyPr>
+          <a:lstStyle/>
+          <a:p>
+            <a:r>
+              <a:rPr lang="en-US" dirty="0"/>
+              <a:t>What aspects of the application this part provides functionality for.</a:t>
+            </a:r>
+          </a:p>
+          <a:p>
+            <a:r>
+              <a:rPr lang="en-US" dirty="0"/>
+              <a:t>For a Table Illustrate: Insert, Update, and Delete functions.</a:t>
+            </a:r>
+          </a:p>
+          <a:p>
+            <a:r>
+              <a:rPr lang="en-US" dirty="0"/>
+              <a:t>For Selection Tool: Illustrate using it on at least two different tables.</a:t>
+            </a:r>
+          </a:p>
+          <a:p>
+            <a:r>
+              <a:rPr lang="en-US" dirty="0"/>
+              <a:t>Lastly, show key blocks of the code (formatting, comments, and names).</a:t>
+            </a:r>
+          </a:p>
+        </p:txBody>
+      </p:sp>
+    </p:spTree>
+    <p:extLst>
+      <p:ext uri="{BB962C8B-B14F-4D97-AF65-F5344CB8AC3E}">
+        <p14:creationId xmlns:p14="http://schemas.microsoft.com/office/powerpoint/2010/main" val="750565662"/>
+      </p:ext>
+    </p:extLst>
+  </p:cSld>
+  <p:clrMapOvr>
+    <a:masterClrMapping/>
+  </p:clrMapOvr>
+</p:sld>
+</file>
+
 <file path=ppt/slides/slide2.xml><?xml version="1.0" encoding="utf-8"?>
 <p:sld xmlns:a="http://schemas.openxmlformats.org/drawingml/2006/main" xmlns:r="http://schemas.openxmlformats.org/officeDocument/2006/relationships" xmlns:p="http://schemas.openxmlformats.org/presentationml/2006/main">
   <p:cSld>
@@ -7933,24 +8050,10 @@
           <a:lstStyle/>
           <a:p>
             <a:r>
-              <a:rPr lang="en-US" dirty="0"/>
-              <a:t>Application Demo</a:t>
-            </a:r>
-            <a:br>
-              <a:rPr lang="en-US" dirty="0"/>
-            </a:br>
-            <a:r>
-              <a:rPr lang="en-US" sz="2000" dirty="0"/>
-              <a:t>There should </a:t>
-            </a:r>
-            <a:r>
-              <a:rPr lang="en-US" sz="2000"/>
-              <a:t>be a Part </a:t>
-            </a:r>
-            <a:r>
-              <a:rPr lang="en-US" sz="2000" dirty="0"/>
-              <a:t>for each person in the group</a:t>
-            </a:r>
+              <a:rPr lang="en-US" dirty="0" err="1"/>
+              <a:t>CharactersLayout</a:t>
+            </a:r>
+            <a:endParaRPr lang="en-US" sz="2000" dirty="0"/>
           </a:p>
         </p:txBody>
       </p:sp>
@@ -7972,26 +8075,18 @@
           <a:lstStyle/>
           <a:p>
             <a:r>
+              <a:rPr lang="en-US" dirty="0" err="1"/>
+              <a:t>CharactersLayout</a:t>
+            </a:r>
+            <a:r>
               <a:rPr lang="en-US" dirty="0"/>
-              <a:t>What aspects of the application this part provides functionality for.</a:t>
+              <a:t> displays all characters in the database and the stats for each player the user selects.  </a:t>
             </a:r>
           </a:p>
           <a:p>
             <a:r>
               <a:rPr lang="en-US" dirty="0"/>
-              <a:t>For a Table Illustrate: Insert, Update, and Delete functions.</a:t>
-            </a:r>
-          </a:p>
-          <a:p>
-            <a:r>
-              <a:rPr lang="en-US" dirty="0"/>
-              <a:t>For Selection Tool: Illustrate using it on at least two different tables.</a:t>
-            </a:r>
-          </a:p>
-          <a:p>
-            <a:r>
-              <a:rPr lang="en-US" dirty="0"/>
-              <a:t>Lastly, show key blocks of the code (formatting, comments, and names).</a:t>
+              <a:t>Useful for seeing what characters belong to what users, seeing how much health, stamina, strength, and location of character</a:t>
             </a:r>
           </a:p>
         </p:txBody>
@@ -8000,6 +8095,663 @@
     <p:extLst>
       <p:ext uri="{BB962C8B-B14F-4D97-AF65-F5344CB8AC3E}">
         <p14:creationId xmlns:p14="http://schemas.microsoft.com/office/powerpoint/2010/main" val="39425359"/>
+      </p:ext>
+    </p:extLst>
+  </p:cSld>
+  <p:clrMapOvr>
+    <a:masterClrMapping/>
+  </p:clrMapOvr>
+</p:sld>
+</file>
+
+<file path=ppt/slides/slide5.xml><?xml version="1.0" encoding="utf-8"?>
+<p:sld xmlns:a="http://schemas.openxmlformats.org/drawingml/2006/main" xmlns:r="http://schemas.openxmlformats.org/officeDocument/2006/relationships" xmlns:p="http://schemas.openxmlformats.org/presentationml/2006/main">
+  <p:cSld>
+    <p:spTree>
+      <p:nvGrpSpPr>
+        <p:cNvPr id="1" name=""/>
+        <p:cNvGrpSpPr/>
+        <p:nvPr/>
+      </p:nvGrpSpPr>
+      <p:grpSpPr>
+        <a:xfrm>
+          <a:off x="0" y="0"/>
+          <a:ext cx="0" cy="0"/>
+          <a:chOff x="0" y="0"/>
+          <a:chExt cx="0" cy="0"/>
+        </a:xfrm>
+      </p:grpSpPr>
+      <p:sp>
+        <p:nvSpPr>
+          <p:cNvPr id="2" name="Title 1"/>
+          <p:cNvSpPr>
+            <a:spLocks noGrp="1"/>
+          </p:cNvSpPr>
+          <p:nvPr>
+            <p:ph type="title"/>
+          </p:nvPr>
+        </p:nvSpPr>
+        <p:spPr/>
+        <p:txBody>
+          <a:bodyPr>
+            <a:normAutofit/>
+          </a:bodyPr>
+          <a:lstStyle/>
+          <a:p>
+            <a:r>
+              <a:rPr lang="en-US" dirty="0" err="1"/>
+              <a:t>CharactersLayout</a:t>
+            </a:r>
+            <a:r>
+              <a:rPr lang="en-US" dirty="0"/>
+              <a:t>: Insert</a:t>
+            </a:r>
+            <a:endParaRPr lang="en-US" sz="2000" dirty="0"/>
+          </a:p>
+        </p:txBody>
+      </p:sp>
+      <p:sp>
+        <p:nvSpPr>
+          <p:cNvPr id="7" name="Content Placeholder 6"/>
+          <p:cNvSpPr>
+            <a:spLocks noGrp="1"/>
+          </p:cNvSpPr>
+          <p:nvPr>
+            <p:ph idx="1"/>
+          </p:nvPr>
+        </p:nvSpPr>
+        <p:spPr/>
+        <p:txBody>
+          <a:bodyPr>
+            <a:normAutofit/>
+          </a:bodyPr>
+          <a:lstStyle/>
+          <a:p>
+            <a:r>
+              <a:rPr lang="en-US" dirty="0" err="1"/>
+              <a:t>AddCharacter</a:t>
+            </a:r>
+            <a:r>
+              <a:rPr lang="en-US" dirty="0"/>
+              <a:t> and </a:t>
+            </a:r>
+            <a:r>
+              <a:rPr lang="en-US" dirty="0" err="1"/>
+              <a:t>AddUser</a:t>
+            </a:r>
+            <a:r>
+              <a:rPr lang="en-US" dirty="0"/>
+              <a:t> are classes that utilize the insert SQL functions.  </a:t>
+            </a:r>
+          </a:p>
+          <a:p>
+            <a:r>
+              <a:rPr lang="en-US" dirty="0"/>
+              <a:t>Example: </a:t>
+            </a:r>
+          </a:p>
+          <a:p>
+            <a:endParaRPr lang="en-US" dirty="0"/>
+          </a:p>
+        </p:txBody>
+      </p:sp>
+      <p:pic>
+        <p:nvPicPr>
+          <p:cNvPr id="3" name="Picture 2">
+            <a:extLst>
+              <a:ext uri="{FF2B5EF4-FFF2-40B4-BE49-F238E27FC236}">
+                <a16:creationId xmlns:a16="http://schemas.microsoft.com/office/drawing/2014/main" id="{0FDB5958-8B32-4F27-AB45-E75E89105123}"/>
+              </a:ext>
+            </a:extLst>
+          </p:cNvPr>
+          <p:cNvPicPr>
+            <a:picLocks noChangeAspect="1"/>
+          </p:cNvPicPr>
+          <p:nvPr/>
+        </p:nvPicPr>
+        <p:blipFill>
+          <a:blip r:embed="rId2"/>
+          <a:stretch>
+            <a:fillRect/>
+          </a:stretch>
+        </p:blipFill>
+        <p:spPr>
+          <a:xfrm>
+            <a:off x="670560" y="4099561"/>
+            <a:ext cx="7802880" cy="1749737"/>
+          </a:xfrm>
+          <a:prstGeom prst="rect">
+            <a:avLst/>
+          </a:prstGeom>
+        </p:spPr>
+      </p:pic>
+    </p:spTree>
+    <p:extLst>
+      <p:ext uri="{BB962C8B-B14F-4D97-AF65-F5344CB8AC3E}">
+        <p14:creationId xmlns:p14="http://schemas.microsoft.com/office/powerpoint/2010/main" val="3553748820"/>
+      </p:ext>
+    </p:extLst>
+  </p:cSld>
+  <p:clrMapOvr>
+    <a:masterClrMapping/>
+  </p:clrMapOvr>
+</p:sld>
+</file>
+
+<file path=ppt/slides/slide6.xml><?xml version="1.0" encoding="utf-8"?>
+<p:sld xmlns:a="http://schemas.openxmlformats.org/drawingml/2006/main" xmlns:r="http://schemas.openxmlformats.org/officeDocument/2006/relationships" xmlns:p="http://schemas.openxmlformats.org/presentationml/2006/main">
+  <p:cSld>
+    <p:spTree>
+      <p:nvGrpSpPr>
+        <p:cNvPr id="1" name=""/>
+        <p:cNvGrpSpPr/>
+        <p:nvPr/>
+      </p:nvGrpSpPr>
+      <p:grpSpPr>
+        <a:xfrm>
+          <a:off x="0" y="0"/>
+          <a:ext cx="0" cy="0"/>
+          <a:chOff x="0" y="0"/>
+          <a:chExt cx="0" cy="0"/>
+        </a:xfrm>
+      </p:grpSpPr>
+      <p:sp>
+        <p:nvSpPr>
+          <p:cNvPr id="2" name="Title 1"/>
+          <p:cNvSpPr>
+            <a:spLocks noGrp="1"/>
+          </p:cNvSpPr>
+          <p:nvPr>
+            <p:ph type="title"/>
+          </p:nvPr>
+        </p:nvSpPr>
+        <p:spPr/>
+        <p:txBody>
+          <a:bodyPr>
+            <a:normAutofit/>
+          </a:bodyPr>
+          <a:lstStyle/>
+          <a:p>
+            <a:r>
+              <a:rPr lang="en-US" dirty="0" err="1"/>
+              <a:t>CharactersLayout</a:t>
+            </a:r>
+            <a:r>
+              <a:rPr lang="en-US" dirty="0"/>
+              <a:t>: Update</a:t>
+            </a:r>
+            <a:endParaRPr lang="en-US" sz="2000" dirty="0"/>
+          </a:p>
+        </p:txBody>
+      </p:sp>
+      <p:sp>
+        <p:nvSpPr>
+          <p:cNvPr id="7" name="Content Placeholder 6"/>
+          <p:cNvSpPr>
+            <a:spLocks noGrp="1"/>
+          </p:cNvSpPr>
+          <p:nvPr>
+            <p:ph idx="1"/>
+          </p:nvPr>
+        </p:nvSpPr>
+        <p:spPr/>
+        <p:txBody>
+          <a:bodyPr>
+            <a:normAutofit/>
+          </a:bodyPr>
+          <a:lstStyle/>
+          <a:p>
+            <a:r>
+              <a:rPr lang="en-US" dirty="0" err="1"/>
+              <a:t>EditCharacter</a:t>
+            </a:r>
+            <a:r>
+              <a:rPr lang="en-US" dirty="0"/>
+              <a:t> is a class that utilizes the update SQL function. </a:t>
+            </a:r>
+          </a:p>
+          <a:p>
+            <a:r>
+              <a:rPr lang="en-US" dirty="0"/>
+              <a:t>Example: </a:t>
+            </a:r>
+          </a:p>
+          <a:p>
+            <a:endParaRPr lang="en-US" dirty="0"/>
+          </a:p>
+        </p:txBody>
+      </p:sp>
+      <p:pic>
+        <p:nvPicPr>
+          <p:cNvPr id="4" name="Picture 3">
+            <a:extLst>
+              <a:ext uri="{FF2B5EF4-FFF2-40B4-BE49-F238E27FC236}">
+                <a16:creationId xmlns:a16="http://schemas.microsoft.com/office/drawing/2014/main" id="{55CF15DF-0DCE-4107-AD5D-DCCC60CC7D0B}"/>
+              </a:ext>
+            </a:extLst>
+          </p:cNvPr>
+          <p:cNvPicPr>
+            <a:picLocks noChangeAspect="1"/>
+          </p:cNvPicPr>
+          <p:nvPr/>
+        </p:nvPicPr>
+        <p:blipFill>
+          <a:blip r:embed="rId2"/>
+          <a:stretch>
+            <a:fillRect/>
+          </a:stretch>
+        </p:blipFill>
+        <p:spPr>
+          <a:xfrm>
+            <a:off x="615696" y="3642711"/>
+            <a:ext cx="7912608" cy="2746525"/>
+          </a:xfrm>
+          <a:prstGeom prst="rect">
+            <a:avLst/>
+          </a:prstGeom>
+        </p:spPr>
+      </p:pic>
+    </p:spTree>
+    <p:extLst>
+      <p:ext uri="{BB962C8B-B14F-4D97-AF65-F5344CB8AC3E}">
+        <p14:creationId xmlns:p14="http://schemas.microsoft.com/office/powerpoint/2010/main" val="1914038468"/>
+      </p:ext>
+    </p:extLst>
+  </p:cSld>
+  <p:clrMapOvr>
+    <a:masterClrMapping/>
+  </p:clrMapOvr>
+</p:sld>
+</file>
+
+<file path=ppt/slides/slide7.xml><?xml version="1.0" encoding="utf-8"?>
+<p:sld xmlns:a="http://schemas.openxmlformats.org/drawingml/2006/main" xmlns:r="http://schemas.openxmlformats.org/officeDocument/2006/relationships" xmlns:p="http://schemas.openxmlformats.org/presentationml/2006/main">
+  <p:cSld>
+    <p:spTree>
+      <p:nvGrpSpPr>
+        <p:cNvPr id="1" name=""/>
+        <p:cNvGrpSpPr/>
+        <p:nvPr/>
+      </p:nvGrpSpPr>
+      <p:grpSpPr>
+        <a:xfrm>
+          <a:off x="0" y="0"/>
+          <a:ext cx="0" cy="0"/>
+          <a:chOff x="0" y="0"/>
+          <a:chExt cx="0" cy="0"/>
+        </a:xfrm>
+      </p:grpSpPr>
+      <p:sp>
+        <p:nvSpPr>
+          <p:cNvPr id="2" name="Title 1"/>
+          <p:cNvSpPr>
+            <a:spLocks noGrp="1"/>
+          </p:cNvSpPr>
+          <p:nvPr>
+            <p:ph type="title"/>
+          </p:nvPr>
+        </p:nvSpPr>
+        <p:spPr/>
+        <p:txBody>
+          <a:bodyPr>
+            <a:normAutofit/>
+          </a:bodyPr>
+          <a:lstStyle/>
+          <a:p>
+            <a:r>
+              <a:rPr lang="en-US" dirty="0" err="1"/>
+              <a:t>CharactersLayout</a:t>
+            </a:r>
+            <a:r>
+              <a:rPr lang="en-US" dirty="0"/>
+              <a:t>: Delete</a:t>
+            </a:r>
+            <a:endParaRPr lang="en-US" sz="2000" dirty="0"/>
+          </a:p>
+        </p:txBody>
+      </p:sp>
+      <p:sp>
+        <p:nvSpPr>
+          <p:cNvPr id="7" name="Content Placeholder 6"/>
+          <p:cNvSpPr>
+            <a:spLocks noGrp="1"/>
+          </p:cNvSpPr>
+          <p:nvPr>
+            <p:ph idx="1"/>
+          </p:nvPr>
+        </p:nvSpPr>
+        <p:spPr/>
+        <p:txBody>
+          <a:bodyPr>
+            <a:normAutofit/>
+          </a:bodyPr>
+          <a:lstStyle/>
+          <a:p>
+            <a:r>
+              <a:rPr lang="en-US" dirty="0" err="1"/>
+              <a:t>EditCharacter</a:t>
+            </a:r>
+            <a:r>
+              <a:rPr lang="en-US" dirty="0"/>
+              <a:t> is a class that utilizes the delete SQL function. </a:t>
+            </a:r>
+          </a:p>
+          <a:p>
+            <a:r>
+              <a:rPr lang="en-US" dirty="0"/>
+              <a:t>Example: </a:t>
+            </a:r>
+          </a:p>
+          <a:p>
+            <a:endParaRPr lang="en-US" dirty="0"/>
+          </a:p>
+        </p:txBody>
+      </p:sp>
+      <p:pic>
+        <p:nvPicPr>
+          <p:cNvPr id="3" name="Picture 2">
+            <a:extLst>
+              <a:ext uri="{FF2B5EF4-FFF2-40B4-BE49-F238E27FC236}">
+                <a16:creationId xmlns:a16="http://schemas.microsoft.com/office/drawing/2014/main" id="{04997AC3-F684-4FCB-9B83-5F17C0D5E143}"/>
+              </a:ext>
+            </a:extLst>
+          </p:cNvPr>
+          <p:cNvPicPr>
+            <a:picLocks noChangeAspect="1"/>
+          </p:cNvPicPr>
+          <p:nvPr/>
+        </p:nvPicPr>
+        <p:blipFill>
+          <a:blip r:embed="rId2"/>
+          <a:stretch>
+            <a:fillRect/>
+          </a:stretch>
+        </p:blipFill>
+        <p:spPr>
+          <a:xfrm>
+            <a:off x="621792" y="4312010"/>
+            <a:ext cx="7900416" cy="971624"/>
+          </a:xfrm>
+          <a:prstGeom prst="rect">
+            <a:avLst/>
+          </a:prstGeom>
+        </p:spPr>
+      </p:pic>
+    </p:spTree>
+    <p:extLst>
+      <p:ext uri="{BB962C8B-B14F-4D97-AF65-F5344CB8AC3E}">
+        <p14:creationId xmlns:p14="http://schemas.microsoft.com/office/powerpoint/2010/main" val="1680603667"/>
+      </p:ext>
+    </p:extLst>
+  </p:cSld>
+  <p:clrMapOvr>
+    <a:masterClrMapping/>
+  </p:clrMapOvr>
+</p:sld>
+</file>
+
+<file path=ppt/slides/slide8.xml><?xml version="1.0" encoding="utf-8"?>
+<p:sld xmlns:a="http://schemas.openxmlformats.org/drawingml/2006/main" xmlns:r="http://schemas.openxmlformats.org/officeDocument/2006/relationships" xmlns:p="http://schemas.openxmlformats.org/presentationml/2006/main">
+  <p:cSld>
+    <p:spTree>
+      <p:nvGrpSpPr>
+        <p:cNvPr id="1" name=""/>
+        <p:cNvGrpSpPr/>
+        <p:nvPr/>
+      </p:nvGrpSpPr>
+      <p:grpSpPr>
+        <a:xfrm>
+          <a:off x="0" y="0"/>
+          <a:ext cx="0" cy="0"/>
+          <a:chOff x="0" y="0"/>
+          <a:chExt cx="0" cy="0"/>
+        </a:xfrm>
+      </p:grpSpPr>
+      <p:sp>
+        <p:nvSpPr>
+          <p:cNvPr id="2" name="Title 1"/>
+          <p:cNvSpPr>
+            <a:spLocks noGrp="1"/>
+          </p:cNvSpPr>
+          <p:nvPr>
+            <p:ph type="title"/>
+          </p:nvPr>
+        </p:nvSpPr>
+        <p:spPr/>
+        <p:txBody>
+          <a:bodyPr>
+            <a:normAutofit/>
+          </a:bodyPr>
+          <a:lstStyle/>
+          <a:p>
+            <a:r>
+              <a:rPr lang="en-US" dirty="0" err="1"/>
+              <a:t>CharactersLayout</a:t>
+            </a:r>
+            <a:r>
+              <a:rPr lang="en-US" dirty="0"/>
+              <a:t>: Select</a:t>
+            </a:r>
+            <a:endParaRPr lang="en-US" sz="2000" dirty="0"/>
+          </a:p>
+        </p:txBody>
+      </p:sp>
+      <p:sp>
+        <p:nvSpPr>
+          <p:cNvPr id="7" name="Content Placeholder 6"/>
+          <p:cNvSpPr>
+            <a:spLocks noGrp="1"/>
+          </p:cNvSpPr>
+          <p:nvPr>
+            <p:ph idx="1"/>
+          </p:nvPr>
+        </p:nvSpPr>
+        <p:spPr/>
+        <p:txBody>
+          <a:bodyPr>
+            <a:normAutofit/>
+          </a:bodyPr>
+          <a:lstStyle/>
+          <a:p>
+            <a:r>
+              <a:rPr lang="en-US" dirty="0" err="1"/>
+              <a:t>genCharactersPanel</a:t>
+            </a:r>
+            <a:r>
+              <a:rPr lang="en-US" dirty="0"/>
+              <a:t> and </a:t>
+            </a:r>
+            <a:r>
+              <a:rPr lang="en-US" dirty="0" err="1"/>
+              <a:t>genStatsPanel</a:t>
+            </a:r>
+            <a:r>
+              <a:rPr lang="en-US" dirty="0"/>
+              <a:t> are two functions inside the </a:t>
+            </a:r>
+            <a:r>
+              <a:rPr lang="en-US" dirty="0" err="1"/>
+              <a:t>CharactersLayout</a:t>
+            </a:r>
+            <a:r>
+              <a:rPr lang="en-US" dirty="0"/>
+              <a:t> class that utilizes the select statements frequently. </a:t>
+            </a:r>
+          </a:p>
+          <a:p>
+            <a:r>
+              <a:rPr lang="en-US" dirty="0" err="1"/>
+              <a:t>genCharactersPanel</a:t>
+            </a:r>
+            <a:r>
+              <a:rPr lang="en-US" dirty="0"/>
+              <a:t> a stored procedure that looks like this: </a:t>
+            </a:r>
+          </a:p>
+          <a:p>
+            <a:endParaRPr lang="en-US" dirty="0"/>
+          </a:p>
+        </p:txBody>
+      </p:sp>
+      <p:pic>
+        <p:nvPicPr>
+          <p:cNvPr id="6" name="Picture 5">
+            <a:extLst>
+              <a:ext uri="{FF2B5EF4-FFF2-40B4-BE49-F238E27FC236}">
+                <a16:creationId xmlns:a16="http://schemas.microsoft.com/office/drawing/2014/main" id="{C15A78DF-27D0-4860-8A7D-708BEA0CE78C}"/>
+              </a:ext>
+            </a:extLst>
+          </p:cNvPr>
+          <p:cNvPicPr>
+            <a:picLocks noChangeAspect="1"/>
+          </p:cNvPicPr>
+          <p:nvPr/>
+        </p:nvPicPr>
+        <p:blipFill>
+          <a:blip r:embed="rId2"/>
+          <a:stretch>
+            <a:fillRect/>
+          </a:stretch>
+        </p:blipFill>
+        <p:spPr>
+          <a:xfrm>
+            <a:off x="450056" y="4681078"/>
+            <a:ext cx="8243887" cy="331523"/>
+          </a:xfrm>
+          <a:prstGeom prst="rect">
+            <a:avLst/>
+          </a:prstGeom>
+        </p:spPr>
+      </p:pic>
+    </p:spTree>
+    <p:extLst>
+      <p:ext uri="{BB962C8B-B14F-4D97-AF65-F5344CB8AC3E}">
+        <p14:creationId xmlns:p14="http://schemas.microsoft.com/office/powerpoint/2010/main" val="3512558754"/>
+      </p:ext>
+    </p:extLst>
+  </p:cSld>
+  <p:clrMapOvr>
+    <a:masterClrMapping/>
+  </p:clrMapOvr>
+</p:sld>
+</file>
+
+<file path=ppt/slides/slide9.xml><?xml version="1.0" encoding="utf-8"?>
+<p:sld xmlns:a="http://schemas.openxmlformats.org/drawingml/2006/main" xmlns:r="http://schemas.openxmlformats.org/officeDocument/2006/relationships" xmlns:p="http://schemas.openxmlformats.org/presentationml/2006/main">
+  <p:cSld>
+    <p:spTree>
+      <p:nvGrpSpPr>
+        <p:cNvPr id="1" name=""/>
+        <p:cNvGrpSpPr/>
+        <p:nvPr/>
+      </p:nvGrpSpPr>
+      <p:grpSpPr>
+        <a:xfrm>
+          <a:off x="0" y="0"/>
+          <a:ext cx="0" cy="0"/>
+          <a:chOff x="0" y="0"/>
+          <a:chExt cx="0" cy="0"/>
+        </a:xfrm>
+      </p:grpSpPr>
+      <p:sp>
+        <p:nvSpPr>
+          <p:cNvPr id="2" name="Title 1"/>
+          <p:cNvSpPr>
+            <a:spLocks noGrp="1"/>
+          </p:cNvSpPr>
+          <p:nvPr>
+            <p:ph type="title"/>
+          </p:nvPr>
+        </p:nvSpPr>
+        <p:spPr/>
+        <p:txBody>
+          <a:bodyPr>
+            <a:normAutofit/>
+          </a:bodyPr>
+          <a:lstStyle/>
+          <a:p>
+            <a:r>
+              <a:rPr lang="en-US" dirty="0" err="1"/>
+              <a:t>CharactersLayout</a:t>
+            </a:r>
+            <a:r>
+              <a:rPr lang="en-US" dirty="0"/>
+              <a:t>: Select</a:t>
+            </a:r>
+            <a:endParaRPr lang="en-US" sz="2000" dirty="0"/>
+          </a:p>
+        </p:txBody>
+      </p:sp>
+      <p:sp>
+        <p:nvSpPr>
+          <p:cNvPr id="7" name="Content Placeholder 6"/>
+          <p:cNvSpPr>
+            <a:spLocks noGrp="1"/>
+          </p:cNvSpPr>
+          <p:nvPr>
+            <p:ph idx="1"/>
+          </p:nvPr>
+        </p:nvSpPr>
+        <p:spPr>
+          <a:xfrm>
+            <a:off x="631888" y="1975105"/>
+            <a:ext cx="7345363" cy="3931920"/>
+          </a:xfrm>
+        </p:spPr>
+        <p:txBody>
+          <a:bodyPr>
+            <a:normAutofit/>
+          </a:bodyPr>
+          <a:lstStyle/>
+          <a:p>
+            <a:r>
+              <a:rPr lang="en-US" dirty="0" err="1"/>
+              <a:t>genStatsPanel</a:t>
+            </a:r>
+            <a:r>
+              <a:rPr lang="en-US" dirty="0"/>
+              <a:t> calls this function to retrieve all of its stats: </a:t>
+            </a:r>
+          </a:p>
+          <a:p>
+            <a:endParaRPr lang="en-US" dirty="0"/>
+          </a:p>
+        </p:txBody>
+      </p:sp>
+      <p:pic>
+        <p:nvPicPr>
+          <p:cNvPr id="3" name="Picture 2">
+            <a:extLst>
+              <a:ext uri="{FF2B5EF4-FFF2-40B4-BE49-F238E27FC236}">
+                <a16:creationId xmlns:a16="http://schemas.microsoft.com/office/drawing/2014/main" id="{158494F6-3428-4E0F-8EEA-2F0A64AE35A3}"/>
+              </a:ext>
+            </a:extLst>
+          </p:cNvPr>
+          <p:cNvPicPr>
+            <a:picLocks noChangeAspect="1"/>
+          </p:cNvPicPr>
+          <p:nvPr/>
+        </p:nvPicPr>
+        <p:blipFill>
+          <a:blip r:embed="rId2"/>
+          <a:stretch>
+            <a:fillRect/>
+          </a:stretch>
+        </p:blipFill>
+        <p:spPr>
+          <a:xfrm>
+            <a:off x="1901808" y="2456293"/>
+            <a:ext cx="6474095" cy="4035629"/>
+          </a:xfrm>
+          <a:prstGeom prst="rect">
+            <a:avLst/>
+          </a:prstGeom>
+        </p:spPr>
+      </p:pic>
+    </p:spTree>
+    <p:extLst>
+      <p:ext uri="{BB962C8B-B14F-4D97-AF65-F5344CB8AC3E}">
+        <p14:creationId xmlns:p14="http://schemas.microsoft.com/office/powerpoint/2010/main" val="2731855635"/>
       </p:ext>
     </p:extLst>
   </p:cSld>

</xml_diff>